<commit_message>
updates to discovery issues
capturing modifications made during F2F on validation and security bootstrapping
</commit_message>
<xml_diff>
--- a/PRESENTATIONS/2021-03-online-f2f/2021-03-17-WoT-F2F-Discovery-Issues-McCool.pptx
+++ b/PRESENTATIONS/2021-03-online-f2f/2021-03-17-WoT-F2F-Discovery-Issues-McCool.pptx
@@ -4526,7 +4526,7 @@
           <a:p>
             <a:r>
               <a:rPr lang="en-US" dirty="0"/>
-              <a:t>Mostly a problem for self-description (directories can use </a:t>
+              <a:t>Mostly a problem for self-description (directories may use </a:t>
             </a:r>
             <a:r>
               <a:rPr lang="en-US" dirty="0" err="1"/>
@@ -4534,7 +4534,15 @@
             </a:r>
             <a:r>
               <a:rPr lang="en-US" dirty="0"/>
-              <a:t> for the TD as it has no private information)</a:t>
+              <a:t> for the TD as it has no private information; </a:t>
+            </a:r>
+            <a:r>
+              <a:rPr lang="en-US" i="1" dirty="0"/>
+              <a:t>maybe?</a:t>
+            </a:r>
+            <a:r>
+              <a:rPr lang="en-US" dirty="0"/>
+              <a:t>)</a:t>
             </a:r>
           </a:p>
           <a:p>
@@ -4568,19 +4576,14 @@
             <a:pPr lvl="2"/>
             <a:r>
               <a:rPr lang="en-US" dirty="0"/>
-              <a:t>Error response or other mechanism provides security scheme to </a:t>
-            </a:r>
-            <a:r>
-              <a:rPr lang="en-US"/>
-              <a:t>fetch TD</a:t>
-            </a:r>
-            <a:endParaRPr lang="en-US" dirty="0"/>
+              <a:t>Error response or other mechanism provides security scheme to fetch TD</a:t>
+            </a:r>
           </a:p>
           <a:p>
             <a:pPr lvl="2"/>
             <a:r>
               <a:rPr lang="en-US" dirty="0"/>
-              <a:t>But where does this scheme come from?  It is not given in the TD itself (meta-metadata)</a:t>
+              <a:t>But where does this scheme come from?  Proposal: use "default security scheme"</a:t>
             </a:r>
           </a:p>
           <a:p>
@@ -5036,7 +5039,7 @@
             <a:pPr lvl="1"/>
             <a:r>
               <a:rPr lang="en-CA" dirty="0"/>
-              <a:t>Needed for SPARQL queries and RDF round-tripping</a:t>
+              <a:t>Needed for TD round-tripping with SPARQL queries</a:t>
             </a:r>
           </a:p>
           <a:p>
@@ -5055,7 +5058,7 @@
             <a:pPr lvl="1"/>
             <a:r>
               <a:rPr lang="en-CA" dirty="0"/>
-              <a:t>JSON-LD stability, RDF round-tripping, metadata in "enhanced TDs"</a:t>
+              <a:t>JSON-LD stability, RDF round-tripping, metadata in "enriched TDs"</a:t>
             </a:r>
           </a:p>
           <a:p>
@@ -5676,60 +5679,78 @@
           <a:lstStyle/>
           <a:p>
             <a:r>
-              <a:rPr lang="en-US" dirty="0"/>
+              <a:rPr lang="en-US" sz="2400" dirty="0"/>
               <a:t>Security has been discussing adding signing to preserve TD integrity</a:t>
             </a:r>
           </a:p>
           <a:p>
             <a:r>
-              <a:rPr lang="en-US" dirty="0"/>
+              <a:rPr lang="en-US" sz="2400" dirty="0"/>
               <a:t>This requires a canonical form of TDs</a:t>
             </a:r>
           </a:p>
           <a:p>
             <a:pPr lvl="1"/>
             <a:r>
-              <a:rPr lang="en-US" dirty="0"/>
+              <a:rPr lang="en-US" sz="2000" dirty="0"/>
               <a:t>Needs to be specified in TD spec</a:t>
             </a:r>
           </a:p>
           <a:p>
             <a:pPr lvl="1"/>
             <a:r>
-              <a:rPr lang="en-US" dirty="0"/>
+              <a:rPr lang="en-US" sz="2000" dirty="0"/>
               <a:t>Foundation is JSON canonicalization, but TD-specific elaborations needed, for example, the handling of default values, ordering to simplify processing, etc.</a:t>
             </a:r>
           </a:p>
           <a:p>
             <a:r>
-              <a:rPr lang="en-US" dirty="0"/>
-              <a:t>Various other operations might break signing:</a:t>
+              <a:rPr lang="en-US" sz="2400" dirty="0"/>
+              <a:t>Various other operations might break signing, or require chaining:</a:t>
             </a:r>
           </a:p>
           <a:p>
             <a:pPr lvl="1"/>
             <a:r>
-              <a:rPr lang="en-US" dirty="0"/>
-              <a:t>Insertion of metadata by directories in TDs ("enhanced TDs")</a:t>
+              <a:rPr lang="en-US" sz="2000" dirty="0"/>
+              <a:t>Insertion of metadata by directories in TDs ("enhanced TDs" – must trust directory)</a:t>
             </a:r>
           </a:p>
           <a:p>
             <a:pPr lvl="1"/>
             <a:r>
-              <a:rPr lang="en-US" dirty="0"/>
-              <a:t>Protocol translation</a:t>
-            </a:r>
-          </a:p>
-          <a:p>
-            <a:r>
-              <a:rPr lang="en-US" dirty="0"/>
+              <a:rPr lang="en-US" sz="2000" dirty="0"/>
+              <a:t>Protocol translation (</a:t>
+            </a:r>
+            <a:r>
+              <a:rPr lang="en-US" sz="2000" dirty="0" err="1"/>
+              <a:t>eg</a:t>
+            </a:r>
+            <a:r>
+              <a:rPr lang="en-US" sz="2000" dirty="0"/>
+              <a:t> proxies - can use chaining, must trust proxy)</a:t>
+            </a:r>
+          </a:p>
+          <a:p>
+            <a:r>
+              <a:rPr lang="en-US" sz="2400" dirty="0"/>
               <a:t>Modification of TDs can be handled by chaining</a:t>
             </a:r>
           </a:p>
           <a:p>
             <a:r>
-              <a:rPr lang="en-US" dirty="0"/>
-              <a:t>Also need to consider whether outputs of SPARQL queries need to be canonicalized, signed</a:t>
+              <a:rPr lang="en-US" sz="2400" dirty="0"/>
+              <a:t>Also need to consider whether outputs of SPARQL queries need to be canonicalized, signed; alternatively, can be chained.</a:t>
+            </a:r>
+          </a:p>
+          <a:p>
+            <a:r>
+              <a:rPr lang="en-US" sz="2400" b="1" dirty="0"/>
+              <a:t>Fallback plan: </a:t>
+            </a:r>
+            <a:r>
+              <a:rPr lang="en-US" sz="2400" dirty="0"/>
+              <a:t>just keep the original string and make it available on demand</a:t>
             </a:r>
           </a:p>
           <a:p>
@@ -5816,11 +5837,13 @@
           <a:bodyPr/>
           <a:lstStyle/>
           <a:p>
+            <a:pPr lvl="1"/>
             <a:fld id="{B929AB1E-7FD9-0A40-B7C0-508CCACB3E9A}" type="datetime1">
               <a:rPr lang="en-CA" smtClean="0"/>
+              <a:pPr lvl="1"/>
               <a:t>2021-03-17</a:t>
             </a:fld>
-            <a:endParaRPr lang="en-US"/>
+            <a:endParaRPr lang="en-US" dirty="0"/>
           </a:p>
         </p:txBody>
       </p:sp>
@@ -5898,42 +5921,59 @@
             <p:ph idx="1"/>
           </p:nvPr>
         </p:nvSpPr>
-        <p:spPr/>
-        <p:txBody>
-          <a:bodyPr/>
-          <a:lstStyle/>
-          <a:p>
-            <a:r>
-              <a:rPr lang="en-US" dirty="0"/>
+        <p:spPr>
+          <a:xfrm>
+            <a:off x="838200" y="1027906"/>
+            <a:ext cx="10515600" cy="4878741"/>
+          </a:xfrm>
+        </p:spPr>
+        <p:txBody>
+          <a:bodyPr>
+            <a:noAutofit/>
+          </a:bodyPr>
+          <a:lstStyle/>
+          <a:p>
+            <a:r>
+              <a:rPr lang="en-US" sz="2400" dirty="0"/>
               <a:t>A formal definition of "TD Validation" is needed</a:t>
             </a:r>
           </a:p>
           <a:p>
             <a:r>
-              <a:rPr lang="en-US" dirty="0"/>
+              <a:rPr lang="en-US" sz="2400" dirty="0"/>
               <a:t>This is because directories should only store "valid" TDs</a:t>
             </a:r>
           </a:p>
           <a:p>
             <a:r>
-              <a:rPr lang="en-US" dirty="0"/>
+              <a:rPr lang="en-US" sz="2400" dirty="0"/>
               <a:t>Of course a valid TD is one that "satisfies the TD specification" but not everything in the spec can be validated just by looking at the TD</a:t>
             </a:r>
           </a:p>
           <a:p>
             <a:r>
-              <a:rPr lang="en-US" dirty="0"/>
-              <a:t>Some things such as validating semantic extensions are too expensive to justify</a:t>
-            </a:r>
-          </a:p>
-          <a:p>
-            <a:r>
-              <a:rPr lang="en-US" b="1" dirty="0"/>
-              <a:t>Proposal: </a:t>
-            </a:r>
-            <a:r>
-              <a:rPr lang="en-US" dirty="0"/>
-              <a:t>Define a subset of assertions that can be validated just by using JSON Schema (we already know this subset).</a:t>
+              <a:rPr lang="en-US" sz="2400" dirty="0"/>
+              <a:t>What about semantics?</a:t>
+            </a:r>
+          </a:p>
+          <a:p>
+            <a:r>
+              <a:rPr lang="en-US" sz="2400" b="1" dirty="0"/>
+              <a:t>Proposal 1: </a:t>
+            </a:r>
+            <a:r>
+              <a:rPr lang="en-US" sz="2400" dirty="0"/>
+              <a:t>Define a subset of assertions that can be validated just by using JSON Schema (we already know this subset) for "syntactic validation".  MANDATORY.  Note: does not cover extensions, allows random additional properties...  When (IF) JSON Schema becomes an actual standard, we can swap it in.</a:t>
+            </a:r>
+          </a:p>
+          <a:p>
+            <a:r>
+              <a:rPr lang="en-US" sz="2400" b="1" dirty="0"/>
+              <a:t>Proposal 2:</a:t>
+            </a:r>
+            <a:r>
+              <a:rPr lang="en-US" sz="2400" dirty="0"/>
+              <a:t> Define semantic validation based on SHACL for directories supporting semantic queries; these can also validate extensions if the SHACL can be accessed (TD SHACL also needs to be fetchable).  OPTIONAL, but mandatory for those that do SPARQL.</a:t>
             </a:r>
           </a:p>
         </p:txBody>

</xml_diff>